<commit_message>
small update slides lesson 3
</commit_message>
<xml_diff>
--- a/Lesson slides/Unit 3 - List, Stack, Queue.pptx
+++ b/Lesson slides/Unit 3 - List, Stack, Queue.pptx
@@ -235,7 +235,7 @@
           <a:p>
             <a:fld id="{F314420D-16BA-4EDC-9A71-800590EAD5A3}" type="datetimeFigureOut">
               <a:rPr lang="en-GB" smtClean="0"/>
-              <a:t>06/12/2018</a:t>
+              <a:t>07/12/2018</a:t>
             </a:fld>
             <a:endParaRPr lang="en-GB"/>
           </a:p>
@@ -1908,7 +1908,7 @@
           <a:p>
             <a:fld id="{4AC2990A-2EB2-47B0-9F19-095E0F4CAE2E}" type="datetime1">
               <a:rPr lang="en-GB" smtClean="0"/>
-              <a:t>06/12/2018</a:t>
+              <a:t>07/12/2018</a:t>
             </a:fld>
             <a:endParaRPr lang="en-GB"/>
           </a:p>
@@ -2163,7 +2163,7 @@
           <a:p>
             <a:fld id="{22A5F433-E3C5-406F-95E0-5347F5410F1A}" type="datetime1">
               <a:rPr lang="en-GB" smtClean="0"/>
-              <a:t>06/12/2018</a:t>
+              <a:t>07/12/2018</a:t>
             </a:fld>
             <a:endParaRPr lang="en-GB"/>
           </a:p>
@@ -2481,7 +2481,7 @@
           <a:p>
             <a:fld id="{D4E40994-D892-4C74-B15A-5F6362316C44}" type="datetime1">
               <a:rPr lang="en-GB" smtClean="0"/>
-              <a:t>06/12/2018</a:t>
+              <a:t>07/12/2018</a:t>
             </a:fld>
             <a:endParaRPr lang="en-GB"/>
           </a:p>
@@ -2812,7 +2812,7 @@
           <a:p>
             <a:fld id="{FDC762E4-8EF5-45D8-9FDE-0FF43E771C22}" type="datetime1">
               <a:rPr lang="en-GB" smtClean="0"/>
-              <a:t>06/12/2018</a:t>
+              <a:t>07/12/2018</a:t>
             </a:fld>
             <a:endParaRPr lang="en-GB"/>
           </a:p>
@@ -3130,7 +3130,7 @@
           <a:p>
             <a:fld id="{5E60E461-DE00-407A-AAD1-C1D0E5AC19B1}" type="datetime1">
               <a:rPr lang="en-GB" smtClean="0"/>
-              <a:t>06/12/2018</a:t>
+              <a:t>07/12/2018</a:t>
             </a:fld>
             <a:endParaRPr lang="en-GB"/>
           </a:p>
@@ -3521,7 +3521,7 @@
           <a:p>
             <a:fld id="{048CC5B2-073F-444E-A8DD-B0BEEAC2F081}" type="datetime1">
               <a:rPr lang="en-GB" smtClean="0"/>
-              <a:t>06/12/2018</a:t>
+              <a:t>07/12/2018</a:t>
             </a:fld>
             <a:endParaRPr lang="en-GB"/>
           </a:p>
@@ -3695,7 +3695,7 @@
           <a:p>
             <a:fld id="{DF8D3392-CB98-481E-B2E9-67F4F5E85884}" type="datetime1">
               <a:rPr lang="en-GB" smtClean="0"/>
-              <a:t>06/12/2018</a:t>
+              <a:t>07/12/2018</a:t>
             </a:fld>
             <a:endParaRPr lang="en-GB"/>
           </a:p>
@@ -3879,7 +3879,7 @@
           <a:p>
             <a:fld id="{B23FE606-BE12-4A47-AC4F-9225405D8813}" type="datetime1">
               <a:rPr lang="en-GB" smtClean="0"/>
-              <a:t>06/12/2018</a:t>
+              <a:t>07/12/2018</a:t>
             </a:fld>
             <a:endParaRPr lang="en-GB"/>
           </a:p>
@@ -4053,7 +4053,7 @@
           <a:p>
             <a:fld id="{F2C205BA-54C1-4988-B409-20E622E7CB4B}" type="datetime1">
               <a:rPr lang="en-GB" smtClean="0"/>
-              <a:t>06/12/2018</a:t>
+              <a:t>07/12/2018</a:t>
             </a:fld>
             <a:endParaRPr lang="en-GB"/>
           </a:p>
@@ -4304,7 +4304,7 @@
           <a:p>
             <a:fld id="{BD24C106-E6EE-4935-B79B-58D5A2330348}" type="datetime1">
               <a:rPr lang="en-GB" smtClean="0"/>
-              <a:t>06/12/2018</a:t>
+              <a:t>07/12/2018</a:t>
             </a:fld>
             <a:endParaRPr lang="en-GB"/>
           </a:p>
@@ -4540,7 +4540,7 @@
           <a:p>
             <a:fld id="{1466EE15-B151-4673-B3BD-94D075E86906}" type="datetime1">
               <a:rPr lang="en-GB" smtClean="0"/>
-              <a:t>06/12/2018</a:t>
+              <a:t>07/12/2018</a:t>
             </a:fld>
             <a:endParaRPr lang="en-GB"/>
           </a:p>
@@ -4918,7 +4918,7 @@
           <a:p>
             <a:fld id="{F61A4B8D-3CC5-439C-BCFE-F05DEE19AB17}" type="datetime1">
               <a:rPr lang="en-GB" smtClean="0"/>
-              <a:t>06/12/2018</a:t>
+              <a:t>07/12/2018</a:t>
             </a:fld>
             <a:endParaRPr lang="en-GB"/>
           </a:p>
@@ -5045,7 +5045,7 @@
           <a:p>
             <a:fld id="{6796421B-81ED-483E-AC8A-54892A26C8C5}" type="datetime1">
               <a:rPr lang="en-GB" smtClean="0"/>
-              <a:t>06/12/2018</a:t>
+              <a:t>07/12/2018</a:t>
             </a:fld>
             <a:endParaRPr lang="en-GB"/>
           </a:p>
@@ -5144,7 +5144,7 @@
           <a:p>
             <a:fld id="{E8315253-8A1B-407F-97DA-07DFE52AB41D}" type="datetime1">
               <a:rPr lang="en-GB" smtClean="0"/>
-              <a:t>06/12/2018</a:t>
+              <a:t>07/12/2018</a:t>
             </a:fld>
             <a:endParaRPr lang="en-GB"/>
           </a:p>
@@ -5403,7 +5403,7 @@
           <a:p>
             <a:fld id="{EC0837CD-FB98-4458-B4BB-BD72FC557B2C}" type="datetime1">
               <a:rPr lang="en-GB" smtClean="0"/>
-              <a:t>06/12/2018</a:t>
+              <a:t>07/12/2018</a:t>
             </a:fld>
             <a:endParaRPr lang="en-GB"/>
           </a:p>
@@ -5670,7 +5670,7 @@
           <a:p>
             <a:fld id="{AA44DDB6-D08D-4CCA-90B0-817184E41EB3}" type="datetime1">
               <a:rPr lang="en-GB" smtClean="0"/>
-              <a:t>06/12/2018</a:t>
+              <a:t>07/12/2018</a:t>
             </a:fld>
             <a:endParaRPr lang="en-GB"/>
           </a:p>
@@ -6419,7 +6419,7 @@
           <a:p>
             <a:fld id="{E06C14C1-8B78-465F-B085-617B8F695A74}" type="datetime1">
               <a:rPr lang="en-GB" smtClean="0"/>
-              <a:t>06/12/2018</a:t>
+              <a:t>07/12/2018</a:t>
             </a:fld>
             <a:endParaRPr lang="en-GB"/>
           </a:p>
@@ -7271,8 +7271,8 @@
           </a:p>
         </p:txBody>
       </p:sp>
-      <mc:AlternateContent xmlns:mc="http://schemas.openxmlformats.org/markup-compatibility/2006">
-        <mc:Choice xmlns:a14="http://schemas.microsoft.com/office/drawing/2010/main" Requires="a14">
+      <mc:AlternateContent xmlns:mc="http://schemas.openxmlformats.org/markup-compatibility/2006" xmlns:a14="http://schemas.microsoft.com/office/drawing/2010/main">
+        <mc:Choice Requires="a14">
           <p:sp>
             <p:nvSpPr>
               <p:cNvPr id="5" name="Rectangle 4"/>
@@ -7496,7 +7496,7 @@
             </p:txBody>
           </p:sp>
         </mc:Choice>
-        <mc:Fallback>
+        <mc:Fallback xmlns="">
           <p:sp>
             <p:nvSpPr>
               <p:cNvPr id="5" name="Rectangle 4"/>
@@ -7794,8 +7794,8 @@
           </a:prstGeom>
         </p:spPr>
       </p:pic>
-      <mc:AlternateContent xmlns:mc="http://schemas.openxmlformats.org/markup-compatibility/2006">
-        <mc:Choice xmlns:a14="http://schemas.microsoft.com/office/drawing/2010/main" Requires="a14">
+      <mc:AlternateContent xmlns:mc="http://schemas.openxmlformats.org/markup-compatibility/2006" xmlns:a14="http://schemas.microsoft.com/office/drawing/2010/main">
+        <mc:Choice Requires="a14">
           <p:sp>
             <p:nvSpPr>
               <p:cNvPr id="6" name="Rectangle 5"/>
@@ -8019,7 +8019,7 @@
             </p:txBody>
           </p:sp>
         </mc:Choice>
-        <mc:Fallback>
+        <mc:Fallback xmlns="">
           <p:sp>
             <p:nvSpPr>
               <p:cNvPr id="6" name="Rectangle 5"/>
@@ -8330,8 +8330,8 @@
           </a:p>
         </p:txBody>
       </p:sp>
-      <mc:AlternateContent xmlns:mc="http://schemas.openxmlformats.org/markup-compatibility/2006">
-        <mc:Choice xmlns:a14="http://schemas.microsoft.com/office/drawing/2010/main" Requires="a14">
+      <mc:AlternateContent xmlns:mc="http://schemas.openxmlformats.org/markup-compatibility/2006" xmlns:a14="http://schemas.microsoft.com/office/drawing/2010/main">
+        <mc:Choice Requires="a14">
           <p:sp>
             <p:nvSpPr>
               <p:cNvPr id="5" name="Rectangle 4"/>
@@ -8582,7 +8582,7 @@
             </p:txBody>
           </p:sp>
         </mc:Choice>
-        <mc:Fallback>
+        <mc:Fallback xmlns="">
           <p:sp>
             <p:nvSpPr>
               <p:cNvPr id="5" name="Rectangle 4"/>
@@ -8909,8 +8909,8 @@
           </a:p>
         </p:txBody>
       </p:sp>
-      <mc:AlternateContent xmlns:mc="http://schemas.openxmlformats.org/markup-compatibility/2006">
-        <mc:Choice xmlns:a14="http://schemas.microsoft.com/office/drawing/2010/main" Requires="a14">
+      <mc:AlternateContent xmlns:mc="http://schemas.openxmlformats.org/markup-compatibility/2006" xmlns:a14="http://schemas.microsoft.com/office/drawing/2010/main">
+        <mc:Choice Requires="a14">
           <p:sp>
             <p:nvSpPr>
               <p:cNvPr id="5" name="Rectangle 4"/>
@@ -9287,7 +9287,7 @@
             </p:txBody>
           </p:sp>
         </mc:Choice>
-        <mc:Fallback>
+        <mc:Fallback xmlns="">
           <p:sp>
             <p:nvSpPr>
               <p:cNvPr id="5" name="Rectangle 4"/>
@@ -9642,8 +9642,8 @@
           </a:p>
         </p:txBody>
       </p:sp>
-      <mc:AlternateContent xmlns:mc="http://schemas.openxmlformats.org/markup-compatibility/2006">
-        <mc:Choice xmlns:a14="http://schemas.microsoft.com/office/drawing/2010/main" Requires="a14">
+      <mc:AlternateContent xmlns:mc="http://schemas.openxmlformats.org/markup-compatibility/2006" xmlns:a14="http://schemas.microsoft.com/office/drawing/2010/main">
+        <mc:Choice Requires="a14">
           <p:sp>
             <p:nvSpPr>
               <p:cNvPr id="5" name="Rectangle 4"/>
@@ -10020,7 +10020,7 @@
             </p:txBody>
           </p:sp>
         </mc:Choice>
-        <mc:Fallback>
+        <mc:Fallback xmlns="">
           <p:sp>
             <p:nvSpPr>
               <p:cNvPr id="5" name="Rectangle 4"/>
@@ -10509,8 +10509,8 @@
           </a:p>
         </p:txBody>
       </p:sp>
-      <mc:AlternateContent xmlns:mc="http://schemas.openxmlformats.org/markup-compatibility/2006">
-        <mc:Choice xmlns:a14="http://schemas.microsoft.com/office/drawing/2010/main" Requires="a14">
+      <mc:AlternateContent xmlns:mc="http://schemas.openxmlformats.org/markup-compatibility/2006" xmlns:a14="http://schemas.microsoft.com/office/drawing/2010/main">
+        <mc:Choice Requires="a14">
           <p:sp>
             <p:nvSpPr>
               <p:cNvPr id="5" name="Rectangle 4"/>
@@ -10769,7 +10769,7 @@
             </p:txBody>
           </p:sp>
         </mc:Choice>
-        <mc:Fallback>
+        <mc:Fallback xmlns="">
           <p:sp>
             <p:nvSpPr>
               <p:cNvPr id="5" name="Rectangle 4"/>
@@ -11071,8 +11071,8 @@
           </a:prstGeom>
         </p:spPr>
       </p:pic>
-      <mc:AlternateContent xmlns:mc="http://schemas.openxmlformats.org/markup-compatibility/2006">
-        <mc:Choice xmlns:a14="http://schemas.microsoft.com/office/drawing/2010/main" Requires="a14">
+      <mc:AlternateContent xmlns:mc="http://schemas.openxmlformats.org/markup-compatibility/2006" xmlns:a14="http://schemas.microsoft.com/office/drawing/2010/main">
+        <mc:Choice Requires="a14">
           <p:sp>
             <p:nvSpPr>
               <p:cNvPr id="6" name="Rectangle 5"/>
@@ -11331,7 +11331,7 @@
             </p:txBody>
           </p:sp>
         </mc:Choice>
-        <mc:Fallback>
+        <mc:Fallback xmlns="">
           <p:sp>
             <p:nvSpPr>
               <p:cNvPr id="6" name="Rectangle 5"/>
@@ -11496,8 +11496,8 @@
           </a:p>
         </p:txBody>
       </p:sp>
-      <mc:AlternateContent xmlns:mc="http://schemas.openxmlformats.org/markup-compatibility/2006">
-        <mc:Choice xmlns:a14="http://schemas.microsoft.com/office/drawing/2010/main" Requires="a14">
+      <mc:AlternateContent xmlns:mc="http://schemas.openxmlformats.org/markup-compatibility/2006" xmlns:a14="http://schemas.microsoft.com/office/drawing/2010/main">
+        <mc:Choice Requires="a14">
           <p:sp>
             <p:nvSpPr>
               <p:cNvPr id="5" name="Rectangle 4"/>
@@ -11801,7 +11801,7 @@
             </p:txBody>
           </p:sp>
         </mc:Choice>
-        <mc:Fallback>
+        <mc:Fallback xmlns="">
           <p:sp>
             <p:nvSpPr>
               <p:cNvPr id="5" name="Rectangle 4"/>
@@ -12115,8 +12115,8 @@
           </a:p>
         </p:txBody>
       </p:sp>
-      <mc:AlternateContent xmlns:mc="http://schemas.openxmlformats.org/markup-compatibility/2006">
-        <mc:Choice xmlns:a14="http://schemas.microsoft.com/office/drawing/2010/main" Requires="a14">
+      <mc:AlternateContent xmlns:mc="http://schemas.openxmlformats.org/markup-compatibility/2006" xmlns:a14="http://schemas.microsoft.com/office/drawing/2010/main">
+        <mc:Choice Requires="a14">
           <p:sp>
             <p:nvSpPr>
               <p:cNvPr id="5" name="Rectangle 4"/>
@@ -12566,7 +12566,7 @@
             </p:txBody>
           </p:sp>
         </mc:Choice>
-        <mc:Fallback>
+        <mc:Fallback xmlns="">
           <p:sp>
             <p:nvSpPr>
               <p:cNvPr id="5" name="Rectangle 4"/>
@@ -12992,8 +12992,8 @@
           </a:prstGeom>
         </p:spPr>
       </p:pic>
-      <mc:AlternateContent xmlns:mc="http://schemas.openxmlformats.org/markup-compatibility/2006">
-        <mc:Choice xmlns:a14="http://schemas.microsoft.com/office/drawing/2010/main" Requires="a14">
+      <mc:AlternateContent xmlns:mc="http://schemas.openxmlformats.org/markup-compatibility/2006" xmlns:a14="http://schemas.microsoft.com/office/drawing/2010/main">
+        <mc:Choice Requires="a14">
           <p:sp>
             <p:nvSpPr>
               <p:cNvPr id="6" name="Rectangle 5"/>
@@ -13436,7 +13436,7 @@
             </p:txBody>
           </p:sp>
         </mc:Choice>
-        <mc:Fallback>
+        <mc:Fallback xmlns="">
           <p:sp>
             <p:nvSpPr>
               <p:cNvPr id="6" name="Rectangle 5"/>
@@ -15088,7 +15088,35 @@
                 <a:latin typeface="Consolas" panose="020B0609020204030204" pitchFamily="49" charset="0"/>
                 <a:cs typeface="Consolas" panose="020B0609020204030204" pitchFamily="49" charset="0"/>
               </a:rPr>
-              <a:t>(List&lt;T&gt; list, Node&lt;T&gt; node, T </a:t>
+              <a:t>(</a:t>
+            </a:r>
+            <a:r>
+              <a:rPr lang="nl-NL" dirty="0" err="1">
+                <a:latin typeface="Consolas" panose="020B0609020204030204" pitchFamily="49" charset="0"/>
+                <a:cs typeface="Consolas" panose="020B0609020204030204" pitchFamily="49" charset="0"/>
+              </a:rPr>
+              <a:t>DLList</a:t>
+            </a:r>
+            <a:r>
+              <a:rPr lang="nl-NL" dirty="0">
+                <a:latin typeface="Consolas" panose="020B0609020204030204" pitchFamily="49" charset="0"/>
+                <a:cs typeface="Consolas" panose="020B0609020204030204" pitchFamily="49" charset="0"/>
+              </a:rPr>
+              <a:t>&lt;T&gt; list, </a:t>
+            </a:r>
+            <a:r>
+              <a:rPr lang="nl-NL" dirty="0" err="1">
+                <a:latin typeface="Consolas" panose="020B0609020204030204" pitchFamily="49" charset="0"/>
+                <a:cs typeface="Consolas" panose="020B0609020204030204" pitchFamily="49" charset="0"/>
+              </a:rPr>
+              <a:t>DLNode</a:t>
+            </a:r>
+            <a:r>
+              <a:rPr lang="nl-NL" dirty="0">
+                <a:latin typeface="Consolas" panose="020B0609020204030204" pitchFamily="49" charset="0"/>
+                <a:cs typeface="Consolas" panose="020B0609020204030204" pitchFamily="49" charset="0"/>
+              </a:rPr>
+              <a:t>&lt;T&gt; node, T </a:t>
             </a:r>
             <a:r>
               <a:rPr lang="nl-NL" dirty="0" err="1">
@@ -15140,7 +15168,35 @@
                 <a:latin typeface="Consolas" panose="020B0609020204030204" pitchFamily="49" charset="0"/>
                 <a:cs typeface="Consolas" panose="020B0609020204030204" pitchFamily="49" charset="0"/>
               </a:rPr>
-              <a:t>(List&lt;T&gt; list, Node&lt;T&gt; node, T </a:t>
+              <a:t>(</a:t>
+            </a:r>
+            <a:r>
+              <a:rPr lang="nl-NL" dirty="0" err="1">
+                <a:latin typeface="Consolas" panose="020B0609020204030204" pitchFamily="49" charset="0"/>
+                <a:cs typeface="Consolas" panose="020B0609020204030204" pitchFamily="49" charset="0"/>
+              </a:rPr>
+              <a:t>DLList</a:t>
+            </a:r>
+            <a:r>
+              <a:rPr lang="nl-NL" dirty="0">
+                <a:latin typeface="Consolas" panose="020B0609020204030204" pitchFamily="49" charset="0"/>
+                <a:cs typeface="Consolas" panose="020B0609020204030204" pitchFamily="49" charset="0"/>
+              </a:rPr>
+              <a:t>&lt;T&gt; list, </a:t>
+            </a:r>
+            <a:r>
+              <a:rPr lang="nl-NL" dirty="0" err="1">
+                <a:latin typeface="Consolas" panose="020B0609020204030204" pitchFamily="49" charset="0"/>
+                <a:cs typeface="Consolas" panose="020B0609020204030204" pitchFamily="49" charset="0"/>
+              </a:rPr>
+              <a:t>DLNode</a:t>
+            </a:r>
+            <a:r>
+              <a:rPr lang="nl-NL" dirty="0">
+                <a:latin typeface="Consolas" panose="020B0609020204030204" pitchFamily="49" charset="0"/>
+                <a:cs typeface="Consolas" panose="020B0609020204030204" pitchFamily="49" charset="0"/>
+              </a:rPr>
+              <a:t>&lt;T&gt; node, T </a:t>
             </a:r>
             <a:r>
               <a:rPr lang="nl-NL" dirty="0" err="1">
@@ -15207,7 +15263,21 @@
                 <a:latin typeface="Consolas" panose="020B0609020204030204" pitchFamily="49" charset="0"/>
                 <a:cs typeface="Consolas" panose="020B0609020204030204" pitchFamily="49" charset="0"/>
               </a:rPr>
-              <a:t>(List&lt;T&gt; list, T </a:t>
+              <a:t>(</a:t>
+            </a:r>
+            <a:r>
+              <a:rPr lang="nl-NL" dirty="0" err="1">
+                <a:latin typeface="Consolas" panose="020B0609020204030204" pitchFamily="49" charset="0"/>
+                <a:cs typeface="Consolas" panose="020B0609020204030204" pitchFamily="49" charset="0"/>
+              </a:rPr>
+              <a:t>DLList</a:t>
+            </a:r>
+            <a:r>
+              <a:rPr lang="nl-NL" dirty="0">
+                <a:latin typeface="Consolas" panose="020B0609020204030204" pitchFamily="49" charset="0"/>
+                <a:cs typeface="Consolas" panose="020B0609020204030204" pitchFamily="49" charset="0"/>
+              </a:rPr>
+              <a:t>&lt;T&gt; list, T </a:t>
             </a:r>
             <a:r>
               <a:rPr lang="nl-NL" dirty="0" err="1">
@@ -15259,7 +15329,21 @@
                 <a:latin typeface="Consolas" panose="020B0609020204030204" pitchFamily="49" charset="0"/>
                 <a:cs typeface="Consolas" panose="020B0609020204030204" pitchFamily="49" charset="0"/>
               </a:rPr>
-              <a:t>(List&lt;T&gt; list, T </a:t>
+              <a:t>(</a:t>
+            </a:r>
+            <a:r>
+              <a:rPr lang="nl-NL" dirty="0" err="1">
+                <a:latin typeface="Consolas" panose="020B0609020204030204" pitchFamily="49" charset="0"/>
+                <a:cs typeface="Consolas" panose="020B0609020204030204" pitchFamily="49" charset="0"/>
+              </a:rPr>
+              <a:t>DLList</a:t>
+            </a:r>
+            <a:r>
+              <a:rPr lang="nl-NL" dirty="0">
+                <a:latin typeface="Consolas" panose="020B0609020204030204" pitchFamily="49" charset="0"/>
+                <a:cs typeface="Consolas" panose="020B0609020204030204" pitchFamily="49" charset="0"/>
+              </a:rPr>
+              <a:t>&lt;T&gt; list, T </a:t>
             </a:r>
             <a:r>
               <a:rPr lang="nl-NL" dirty="0" err="1">
@@ -15350,7 +15434,21 @@
                 <a:latin typeface="Consolas" panose="020B0609020204030204" pitchFamily="49" charset="0"/>
                 <a:cs typeface="Consolas" panose="020B0609020204030204" pitchFamily="49" charset="0"/>
               </a:rPr>
-              <a:t>(List&lt;T&gt; list, T </a:t>
+              <a:t>(</a:t>
+            </a:r>
+            <a:r>
+              <a:rPr lang="nl-NL" dirty="0" err="1">
+                <a:latin typeface="Consolas" panose="020B0609020204030204" pitchFamily="49" charset="0"/>
+                <a:cs typeface="Consolas" panose="020B0609020204030204" pitchFamily="49" charset="0"/>
+              </a:rPr>
+              <a:t>DLList</a:t>
+            </a:r>
+            <a:r>
+              <a:rPr lang="nl-NL" dirty="0">
+                <a:latin typeface="Consolas" panose="020B0609020204030204" pitchFamily="49" charset="0"/>
+                <a:cs typeface="Consolas" panose="020B0609020204030204" pitchFamily="49" charset="0"/>
+              </a:rPr>
+              <a:t>&lt;T&gt; list, T </a:t>
             </a:r>
             <a:r>
               <a:rPr lang="nl-NL" dirty="0" err="1">
@@ -15400,13 +15498,27 @@
         </p:nvSpPr>
         <p:spPr>
           <a:xfrm>
-            <a:off x="6013939" y="4738757"/>
-            <a:ext cx="6178061" cy="1754326"/>
+            <a:off x="6185452" y="4813274"/>
+            <a:ext cx="5753991" cy="1754326"/>
           </a:xfrm>
           <a:prstGeom prst="rect">
             <a:avLst/>
           </a:prstGeom>
         </p:spPr>
+        <p:style>
+          <a:lnRef idx="2">
+            <a:schemeClr val="accent1"/>
+          </a:lnRef>
+          <a:fillRef idx="1">
+            <a:schemeClr val="lt1"/>
+          </a:fillRef>
+          <a:effectRef idx="0">
+            <a:schemeClr val="accent1"/>
+          </a:effectRef>
+          <a:fontRef idx="minor">
+            <a:schemeClr val="dk1"/>
+          </a:fontRef>
+        </p:style>
         <p:txBody>
           <a:bodyPr wrap="square">
             <a:spAutoFit/>
@@ -15414,6 +15526,13 @@
           <a:lstStyle/>
           <a:p>
             <a:r>
+              <a:rPr lang="nl-NL" sz="1200" dirty="0">
+                <a:latin typeface="Consolas" panose="020B0609020204030204" pitchFamily="49" charset="0"/>
+                <a:cs typeface="Consolas" panose="020B0609020204030204" pitchFamily="49" charset="0"/>
+              </a:rPr>
+              <a:t>public class </a:t>
+            </a:r>
+            <a:r>
               <a:rPr lang="nl-NL" sz="1200" dirty="0" err="1">
                 <a:latin typeface="Consolas" panose="020B0609020204030204" pitchFamily="49" charset="0"/>
                 <a:cs typeface="Consolas" panose="020B0609020204030204" pitchFamily="49" charset="0"/>
@@ -15425,7 +15544,7 @@
                 <a:latin typeface="Consolas" panose="020B0609020204030204" pitchFamily="49" charset="0"/>
                 <a:cs typeface="Consolas" panose="020B0609020204030204" pitchFamily="49" charset="0"/>
               </a:rPr>
-              <a:t> {</a:t>
+              <a:t>&lt;T&gt; {</a:t>
             </a:r>
           </a:p>
           <a:p>
@@ -15434,21 +15553,35 @@
                 <a:latin typeface="Consolas" panose="020B0609020204030204" pitchFamily="49" charset="0"/>
                 <a:cs typeface="Consolas" panose="020B0609020204030204" pitchFamily="49" charset="0"/>
               </a:rPr>
-              <a:t>    </a:t>
+              <a:t>  </a:t>
             </a:r>
             <a:r>
               <a:rPr lang="nl-NL" sz="1200" dirty="0" err="1">
                 <a:latin typeface="Consolas" panose="020B0609020204030204" pitchFamily="49" charset="0"/>
                 <a:cs typeface="Consolas" panose="020B0609020204030204" pitchFamily="49" charset="0"/>
               </a:rPr>
-              <a:t>prev</a:t>
+              <a:t>DoublyLinkedNode</a:t>
             </a:r>
             <a:r>
               <a:rPr lang="nl-NL" sz="1200" dirty="0">
                 <a:latin typeface="Consolas" panose="020B0609020204030204" pitchFamily="49" charset="0"/>
                 <a:cs typeface="Consolas" panose="020B0609020204030204" pitchFamily="49" charset="0"/>
               </a:rPr>
-              <a:t> // A </a:t>
+              <a:t>&lt;T&gt; </a:t>
+            </a:r>
+            <a:r>
+              <a:rPr lang="nl-NL" sz="1200" dirty="0" err="1">
+                <a:latin typeface="Consolas" panose="020B0609020204030204" pitchFamily="49" charset="0"/>
+                <a:cs typeface="Consolas" panose="020B0609020204030204" pitchFamily="49" charset="0"/>
+              </a:rPr>
+              <a:t>Prev</a:t>
+            </a:r>
+            <a:r>
+              <a:rPr lang="nl-NL" sz="1200" dirty="0">
+                <a:latin typeface="Consolas" panose="020B0609020204030204" pitchFamily="49" charset="0"/>
+                <a:cs typeface="Consolas" panose="020B0609020204030204" pitchFamily="49" charset="0"/>
+              </a:rPr>
+              <a:t>; // A </a:t>
             </a:r>
             <a:r>
               <a:rPr lang="nl-NL" sz="1200" dirty="0" err="1">
@@ -15513,7 +15646,21 @@
                 <a:latin typeface="Consolas" panose="020B0609020204030204" pitchFamily="49" charset="0"/>
                 <a:cs typeface="Consolas" panose="020B0609020204030204" pitchFamily="49" charset="0"/>
               </a:rPr>
-              <a:t>    next // A </a:t>
+              <a:t>  </a:t>
+            </a:r>
+            <a:r>
+              <a:rPr lang="nl-NL" sz="1200" dirty="0" err="1">
+                <a:latin typeface="Consolas" panose="020B0609020204030204" pitchFamily="49" charset="0"/>
+                <a:cs typeface="Consolas" panose="020B0609020204030204" pitchFamily="49" charset="0"/>
+              </a:rPr>
+              <a:t>DoublyLinkedNode</a:t>
+            </a:r>
+            <a:r>
+              <a:rPr lang="nl-NL" sz="1200" dirty="0">
+                <a:latin typeface="Consolas" panose="020B0609020204030204" pitchFamily="49" charset="0"/>
+                <a:cs typeface="Consolas" panose="020B0609020204030204" pitchFamily="49" charset="0"/>
+              </a:rPr>
+              <a:t>&lt;T&gt; Next; // A </a:t>
             </a:r>
             <a:r>
               <a:rPr lang="nl-NL" sz="1200" dirty="0" err="1">
@@ -15564,21 +15711,76 @@
                 <a:latin typeface="Consolas" panose="020B0609020204030204" pitchFamily="49" charset="0"/>
                 <a:cs typeface="Consolas" panose="020B0609020204030204" pitchFamily="49" charset="0"/>
               </a:rPr>
-              <a:t>    data // Data or a </a:t>
+              <a:t>  T Value;</a:t>
+            </a:r>
+          </a:p>
+          <a:p>
+            <a:r>
+              <a:rPr lang="nl-NL" sz="1200" dirty="0">
+                <a:latin typeface="Consolas" panose="020B0609020204030204" pitchFamily="49" charset="0"/>
+                <a:cs typeface="Consolas" panose="020B0609020204030204" pitchFamily="49" charset="0"/>
+              </a:rPr>
+              <a:t>}</a:t>
+            </a:r>
+          </a:p>
+          <a:p>
+            <a:r>
+              <a:rPr lang="nl-NL" sz="1200" dirty="0">
+                <a:latin typeface="Consolas" panose="020B0609020204030204" pitchFamily="49" charset="0"/>
+                <a:cs typeface="Consolas" panose="020B0609020204030204" pitchFamily="49" charset="0"/>
+              </a:rPr>
+              <a:t>public class </a:t>
             </a:r>
             <a:r>
               <a:rPr lang="nl-NL" sz="1200" dirty="0" err="1">
                 <a:latin typeface="Consolas" panose="020B0609020204030204" pitchFamily="49" charset="0"/>
                 <a:cs typeface="Consolas" panose="020B0609020204030204" pitchFamily="49" charset="0"/>
               </a:rPr>
-              <a:t>reference</a:t>
+              <a:t>DoublyLinkedList</a:t>
             </a:r>
             <a:r>
               <a:rPr lang="nl-NL" sz="1200" dirty="0">
                 <a:latin typeface="Consolas" panose="020B0609020204030204" pitchFamily="49" charset="0"/>
                 <a:cs typeface="Consolas" panose="020B0609020204030204" pitchFamily="49" charset="0"/>
               </a:rPr>
-              <a:t> </a:t>
+              <a:t>&lt;T&gt; {</a:t>
+            </a:r>
+          </a:p>
+          <a:p>
+            <a:r>
+              <a:rPr lang="nl-NL" sz="1200" dirty="0">
+                <a:latin typeface="Consolas" panose="020B0609020204030204" pitchFamily="49" charset="0"/>
+                <a:cs typeface="Consolas" panose="020B0609020204030204" pitchFamily="49" charset="0"/>
+              </a:rPr>
+              <a:t>  </a:t>
+            </a:r>
+            <a:r>
+              <a:rPr lang="nl-NL" sz="1200" dirty="0" err="1">
+                <a:latin typeface="Consolas" panose="020B0609020204030204" pitchFamily="49" charset="0"/>
+                <a:cs typeface="Consolas" panose="020B0609020204030204" pitchFamily="49" charset="0"/>
+              </a:rPr>
+              <a:t>DoublyLinkedNode</a:t>
+            </a:r>
+            <a:r>
+              <a:rPr lang="nl-NL" sz="1200" dirty="0">
+                <a:latin typeface="Consolas" panose="020B0609020204030204" pitchFamily="49" charset="0"/>
+                <a:cs typeface="Consolas" panose="020B0609020204030204" pitchFamily="49" charset="0"/>
+              </a:rPr>
+              <a:t>&lt;T&gt; </a:t>
+            </a:r>
+            <a:r>
+              <a:rPr lang="nl-NL" sz="1200" dirty="0" err="1">
+                <a:latin typeface="Consolas" panose="020B0609020204030204" pitchFamily="49" charset="0"/>
+                <a:cs typeface="Consolas" panose="020B0609020204030204" pitchFamily="49" charset="0"/>
+              </a:rPr>
+              <a:t>FirstNode</a:t>
+            </a:r>
+            <a:r>
+              <a:rPr lang="nl-NL" sz="1200" dirty="0">
+                <a:latin typeface="Consolas" panose="020B0609020204030204" pitchFamily="49" charset="0"/>
+                <a:cs typeface="Consolas" panose="020B0609020204030204" pitchFamily="49" charset="0"/>
+              </a:rPr>
+              <a:t>;   // points </a:t>
             </a:r>
             <a:r>
               <a:rPr lang="nl-NL" sz="1200" dirty="0" err="1">
@@ -15592,7 +15794,58 @@
                 <a:latin typeface="Consolas" panose="020B0609020204030204" pitchFamily="49" charset="0"/>
                 <a:cs typeface="Consolas" panose="020B0609020204030204" pitchFamily="49" charset="0"/>
               </a:rPr>
-              <a:t> data</a:t>
+              <a:t> first node of list</a:t>
+            </a:r>
+          </a:p>
+          <a:p>
+            <a:r>
+              <a:rPr lang="nl-NL" sz="1200" dirty="0">
+                <a:latin typeface="Consolas" panose="020B0609020204030204" pitchFamily="49" charset="0"/>
+                <a:cs typeface="Consolas" panose="020B0609020204030204" pitchFamily="49" charset="0"/>
+              </a:rPr>
+              <a:t>  </a:t>
+            </a:r>
+            <a:r>
+              <a:rPr lang="nl-NL" sz="1200" dirty="0" err="1">
+                <a:latin typeface="Consolas" panose="020B0609020204030204" pitchFamily="49" charset="0"/>
+                <a:cs typeface="Consolas" panose="020B0609020204030204" pitchFamily="49" charset="0"/>
+              </a:rPr>
+              <a:t>DoublyLinkedNode</a:t>
+            </a:r>
+            <a:r>
+              <a:rPr lang="nl-NL" sz="1200" dirty="0">
+                <a:latin typeface="Consolas" panose="020B0609020204030204" pitchFamily="49" charset="0"/>
+                <a:cs typeface="Consolas" panose="020B0609020204030204" pitchFamily="49" charset="0"/>
+              </a:rPr>
+              <a:t>&lt;T&gt; </a:t>
+            </a:r>
+            <a:r>
+              <a:rPr lang="nl-NL" sz="1200" dirty="0" err="1">
+                <a:latin typeface="Consolas" panose="020B0609020204030204" pitchFamily="49" charset="0"/>
+                <a:cs typeface="Consolas" panose="020B0609020204030204" pitchFamily="49" charset="0"/>
+              </a:rPr>
+              <a:t>LastNode</a:t>
+            </a:r>
+            <a:r>
+              <a:rPr lang="nl-NL" sz="1200" dirty="0">
+                <a:latin typeface="Consolas" panose="020B0609020204030204" pitchFamily="49" charset="0"/>
+                <a:cs typeface="Consolas" panose="020B0609020204030204" pitchFamily="49" charset="0"/>
+              </a:rPr>
+              <a:t>;    // points </a:t>
+            </a:r>
+            <a:r>
+              <a:rPr lang="nl-NL" sz="1200" dirty="0" err="1">
+                <a:latin typeface="Consolas" panose="020B0609020204030204" pitchFamily="49" charset="0"/>
+                <a:cs typeface="Consolas" panose="020B0609020204030204" pitchFamily="49" charset="0"/>
+              </a:rPr>
+              <a:t>to</a:t>
+            </a:r>
+            <a:r>
+              <a:rPr lang="nl-NL" sz="1200" dirty="0">
+                <a:latin typeface="Consolas" panose="020B0609020204030204" pitchFamily="49" charset="0"/>
+                <a:cs typeface="Consolas" panose="020B0609020204030204" pitchFamily="49" charset="0"/>
+              </a:rPr>
+              <a:t> last node of list</a:t>
             </a:r>
           </a:p>
           <a:p>
@@ -15604,129 +15857,165 @@
               <a:t>}</a:t>
             </a:r>
           </a:p>
-          <a:p>
-            <a:r>
-              <a:rPr lang="nl-NL" sz="1200" dirty="0" err="1">
+        </p:txBody>
+      </p:sp>
+      <p:sp>
+        <p:nvSpPr>
+          <p:cNvPr id="5" name="Rechthoek 4">
+            <a:extLst>
+              <a:ext uri="{FF2B5EF4-FFF2-40B4-BE49-F238E27FC236}">
+                <a16:creationId xmlns:a16="http://schemas.microsoft.com/office/drawing/2014/main" id="{CAA99138-011D-4D15-A08E-CE8990167B46}"/>
+              </a:ext>
+            </a:extLst>
+          </p:cNvPr>
+          <p:cNvSpPr/>
+          <p:nvPr/>
+        </p:nvSpPr>
+        <p:spPr>
+          <a:xfrm>
+            <a:off x="6095999" y="152817"/>
+            <a:ext cx="5843443" cy="1815882"/>
+          </a:xfrm>
+          <a:prstGeom prst="rect">
+            <a:avLst/>
+          </a:prstGeom>
+        </p:spPr>
+        <p:style>
+          <a:lnRef idx="2">
+            <a:schemeClr val="accent1"/>
+          </a:lnRef>
+          <a:fillRef idx="1">
+            <a:schemeClr val="lt1"/>
+          </a:fillRef>
+          <a:effectRef idx="0">
+            <a:schemeClr val="accent1"/>
+          </a:effectRef>
+          <a:fontRef idx="minor">
+            <a:schemeClr val="dk1"/>
+          </a:fontRef>
+        </p:style>
+        <p:txBody>
+          <a:bodyPr wrap="square">
+            <a:spAutoFit/>
+          </a:bodyPr>
+          <a:lstStyle/>
+          <a:p>
+            <a:r>
+              <a:rPr lang="nl-NL" sz="1400" dirty="0">
                 <a:latin typeface="Consolas" panose="020B0609020204030204" pitchFamily="49" charset="0"/>
-                <a:cs typeface="Consolas" panose="020B0609020204030204" pitchFamily="49" charset="0"/>
               </a:rPr>
-              <a:t>DoublyLinkedList</a:t>
-            </a:r>
-            <a:r>
-              <a:rPr lang="nl-NL" sz="1200" dirty="0">
+              <a:t>public class Node&lt;T&gt; </a:t>
+            </a:r>
+            <a:r>
+              <a:rPr lang="nl-NL" sz="1400" dirty="0" err="1">
                 <a:latin typeface="Consolas" panose="020B0609020204030204" pitchFamily="49" charset="0"/>
-                <a:cs typeface="Consolas" panose="020B0609020204030204" pitchFamily="49" charset="0"/>
+              </a:rPr>
+              <a:t>where</a:t>
+            </a:r>
+            <a:r>
+              <a:rPr lang="nl-NL" sz="1400" dirty="0">
+                <a:latin typeface="Consolas" panose="020B0609020204030204" pitchFamily="49" charset="0"/>
+              </a:rPr>
+              <a:t> T : </a:t>
+            </a:r>
+            <a:r>
+              <a:rPr lang="nl-NL" sz="1400" dirty="0" err="1">
+                <a:latin typeface="Consolas" panose="020B0609020204030204" pitchFamily="49" charset="0"/>
+              </a:rPr>
+              <a:t>IComparable</a:t>
+            </a:r>
+            <a:r>
+              <a:rPr lang="nl-NL" sz="1400" dirty="0">
+                <a:latin typeface="Consolas" panose="020B0609020204030204" pitchFamily="49" charset="0"/>
               </a:rPr>
               <a:t> {</a:t>
             </a:r>
           </a:p>
           <a:p>
             <a:r>
-              <a:rPr lang="nl-NL" sz="1200" dirty="0">
+              <a:rPr lang="nl-NL" sz="1400" dirty="0">
                 <a:latin typeface="Consolas" panose="020B0609020204030204" pitchFamily="49" charset="0"/>
-                <a:cs typeface="Consolas" panose="020B0609020204030204" pitchFamily="49" charset="0"/>
               </a:rPr>
-              <a:t>     </a:t>
-            </a:r>
-            <a:r>
-              <a:rPr lang="nl-NL" sz="1200" dirty="0" err="1">
+              <a:t>   T Value;	</a:t>
+            </a:r>
+          </a:p>
+          <a:p>
+            <a:r>
+              <a:rPr lang="nl-NL" sz="1400" dirty="0">
                 <a:latin typeface="Consolas" panose="020B0609020204030204" pitchFamily="49" charset="0"/>
-                <a:cs typeface="Consolas" panose="020B0609020204030204" pitchFamily="49" charset="0"/>
               </a:rPr>
-              <a:t>DoublyLinkedNode</a:t>
-            </a:r>
-            <a:r>
-              <a:rPr lang="nl-NL" sz="1200" dirty="0">
+              <a:t>   Node&lt;T&gt; Next;</a:t>
+            </a:r>
+          </a:p>
+          <a:p>
+            <a:r>
+              <a:rPr lang="nl-NL" sz="1400" dirty="0">
                 <a:latin typeface="Consolas" panose="020B0609020204030204" pitchFamily="49" charset="0"/>
-                <a:cs typeface="Consolas" panose="020B0609020204030204" pitchFamily="49" charset="0"/>
               </a:rPr>
-              <a:t> </a:t>
-            </a:r>
-            <a:r>
-              <a:rPr lang="nl-NL" sz="1200" dirty="0" err="1">
+              <a:t>}</a:t>
+            </a:r>
+          </a:p>
+          <a:p>
+            <a:endParaRPr lang="nl-NL" sz="1400" dirty="0">
+              <a:latin typeface="Consolas" panose="020B0609020204030204" pitchFamily="49" charset="0"/>
+            </a:endParaRPr>
+          </a:p>
+          <a:p>
+            <a:r>
+              <a:rPr lang="nl-NL" sz="1400" dirty="0">
                 <a:latin typeface="Consolas" panose="020B0609020204030204" pitchFamily="49" charset="0"/>
-                <a:cs typeface="Consolas" panose="020B0609020204030204" pitchFamily="49" charset="0"/>
               </a:rPr>
-              <a:t>firstNode</a:t>
-            </a:r>
-            <a:r>
-              <a:rPr lang="nl-NL" sz="1200" dirty="0">
+              <a:t>public class </a:t>
+            </a:r>
+            <a:r>
+              <a:rPr lang="nl-NL" sz="1400" dirty="0" err="1">
                 <a:latin typeface="Consolas" panose="020B0609020204030204" pitchFamily="49" charset="0"/>
-                <a:cs typeface="Consolas" panose="020B0609020204030204" pitchFamily="49" charset="0"/>
               </a:rPr>
-              <a:t>   // points </a:t>
-            </a:r>
-            <a:r>
-              <a:rPr lang="nl-NL" sz="1200" dirty="0" err="1">
+              <a:t>SortedLinkedList</a:t>
+            </a:r>
+            <a:r>
+              <a:rPr lang="nl-NL" sz="1400" dirty="0">
                 <a:latin typeface="Consolas" panose="020B0609020204030204" pitchFamily="49" charset="0"/>
-                <a:cs typeface="Consolas" panose="020B0609020204030204" pitchFamily="49" charset="0"/>
               </a:rPr>
-              <a:t>to</a:t>
-            </a:r>
-            <a:r>
-              <a:rPr lang="nl-NL" sz="1200" dirty="0">
+              <a:t>&lt;T&gt; </a:t>
+            </a:r>
+            <a:r>
+              <a:rPr lang="nl-NL" sz="1400" dirty="0" err="1">
                 <a:latin typeface="Consolas" panose="020B0609020204030204" pitchFamily="49" charset="0"/>
-                <a:cs typeface="Consolas" panose="020B0609020204030204" pitchFamily="49" charset="0"/>
               </a:rPr>
-              <a:t> first node of list</a:t>
-            </a:r>
-          </a:p>
-          <a:p>
-            <a:r>
-              <a:rPr lang="nl-NL" sz="1200" dirty="0">
+              <a:t>where</a:t>
+            </a:r>
+            <a:r>
+              <a:rPr lang="nl-NL" sz="1400" dirty="0">
                 <a:latin typeface="Consolas" panose="020B0609020204030204" pitchFamily="49" charset="0"/>
-                <a:cs typeface="Consolas" panose="020B0609020204030204" pitchFamily="49" charset="0"/>
               </a:rPr>
-              <a:t>     </a:t>
-            </a:r>
-            <a:r>
-              <a:rPr lang="nl-NL" sz="1200" dirty="0" err="1">
+              <a:t> T : </a:t>
+            </a:r>
+            <a:r>
+              <a:rPr lang="nl-NL" sz="1400" dirty="0" err="1">
                 <a:latin typeface="Consolas" panose="020B0609020204030204" pitchFamily="49" charset="0"/>
-                <a:cs typeface="Consolas" panose="020B0609020204030204" pitchFamily="49" charset="0"/>
               </a:rPr>
-              <a:t>DoublyLinkedNode</a:t>
-            </a:r>
-            <a:r>
-              <a:rPr lang="nl-NL" sz="1200" dirty="0">
+              <a:t>IComparable</a:t>
+            </a:r>
+            <a:r>
+              <a:rPr lang="nl-NL" sz="1400" dirty="0">
                 <a:latin typeface="Consolas" panose="020B0609020204030204" pitchFamily="49" charset="0"/>
-                <a:cs typeface="Consolas" panose="020B0609020204030204" pitchFamily="49" charset="0"/>
               </a:rPr>
-              <a:t> </a:t>
-            </a:r>
-            <a:r>
-              <a:rPr lang="nl-NL" sz="1200" dirty="0" err="1">
+              <a:t> {</a:t>
+            </a:r>
+          </a:p>
+          <a:p>
+            <a:r>
+              <a:rPr lang="nl-NL" sz="1400" dirty="0">
                 <a:latin typeface="Consolas" panose="020B0609020204030204" pitchFamily="49" charset="0"/>
-                <a:cs typeface="Consolas" panose="020B0609020204030204" pitchFamily="49" charset="0"/>
               </a:rPr>
-              <a:t>lastNode</a:t>
-            </a:r>
-            <a:r>
-              <a:rPr lang="nl-NL" sz="1200" dirty="0">
+              <a:t>   Node&lt;T&gt; Start;</a:t>
+            </a:r>
+          </a:p>
+          <a:p>
+            <a:r>
+              <a:rPr lang="nl-NL" sz="1400" dirty="0">
                 <a:latin typeface="Consolas" panose="020B0609020204030204" pitchFamily="49" charset="0"/>
-                <a:cs typeface="Consolas" panose="020B0609020204030204" pitchFamily="49" charset="0"/>
-              </a:rPr>
-              <a:t>    // points </a:t>
-            </a:r>
-            <a:r>
-              <a:rPr lang="nl-NL" sz="1200" dirty="0" err="1">
-                <a:latin typeface="Consolas" panose="020B0609020204030204" pitchFamily="49" charset="0"/>
-                <a:cs typeface="Consolas" panose="020B0609020204030204" pitchFamily="49" charset="0"/>
-              </a:rPr>
-              <a:t>to</a:t>
-            </a:r>
-            <a:r>
-              <a:rPr lang="nl-NL" sz="1200" dirty="0">
-                <a:latin typeface="Consolas" panose="020B0609020204030204" pitchFamily="49" charset="0"/>
-                <a:cs typeface="Consolas" panose="020B0609020204030204" pitchFamily="49" charset="0"/>
-              </a:rPr>
-              <a:t> last node of list</a:t>
-            </a:r>
-          </a:p>
-          <a:p>
-            <a:r>
-              <a:rPr lang="nl-NL" sz="1200" dirty="0">
-                <a:latin typeface="Consolas" panose="020B0609020204030204" pitchFamily="49" charset="0"/>
-                <a:cs typeface="Consolas" panose="020B0609020204030204" pitchFamily="49" charset="0"/>
               </a:rPr>
               <a:t>}</a:t>
             </a:r>
@@ -22842,8 +23131,8 @@
           </a:p>
         </p:txBody>
       </p:sp>
-      <mc:AlternateContent xmlns:mc="http://schemas.openxmlformats.org/markup-compatibility/2006">
-        <mc:Choice xmlns:a14="http://schemas.microsoft.com/office/drawing/2010/main" Requires="a14">
+      <mc:AlternateContent xmlns:mc="http://schemas.openxmlformats.org/markup-compatibility/2006" xmlns:a14="http://schemas.microsoft.com/office/drawing/2010/main">
+        <mc:Choice Requires="a14">
           <p:sp>
             <p:nvSpPr>
               <p:cNvPr id="3" name="Content Placeholder 2"/>
@@ -23063,7 +23352,7 @@
             </p:txBody>
           </p:sp>
         </mc:Choice>
-        <mc:Fallback>
+        <mc:Fallback xmlns="">
           <p:sp>
             <p:nvSpPr>
               <p:cNvPr id="3" name="Content Placeholder 2"/>

</xml_diff>